<commit_message>
Added Hands On Demos - Day 4
</commit_message>
<xml_diff>
--- a/3. Spring REST/Day 4/Slides/3. Building the Friends Web Services/building-the-friends-web-services-slides.pptx
+++ b/3. Spring REST/Day 4/Slides/3. Building the Friends Web Services/building-the-friends-web-services-slides.pptx
@@ -5,7 +5,7 @@
     <p:sldMasterId id="2147483648" r:id="rId1"/>
   </p:sldMasterIdLst>
   <p:notesMasterIdLst>
-    <p:notesMasterId r:id="rId36"/>
+    <p:notesMasterId r:id="rId35"/>
   </p:notesMasterIdLst>
   <p:sldIdLst>
     <p:sldId id="256" r:id="rId3"/>
@@ -40,7 +40,6 @@
     <p:sldId id="286" r:id="rId32"/>
     <p:sldId id="287" r:id="rId33"/>
     <p:sldId id="288" r:id="rId34"/>
-    <p:sldId id="257" r:id="rId35"/>
   </p:sldIdLst>
   <p:sldSz cx="16256000" cy="9144000"/>
   <p:notesSz cx="16256000" cy="9144000"/>
@@ -16811,204 +16810,6 @@
       <p:sp>
         <p:nvSpPr>
           <p:cNvPr id="6" name="Slide Number Placeholder 5"/>
-          <p:cNvSpPr>
-            <a:spLocks noGrp="1"/>
-          </p:cNvSpPr>
-          <p:nvPr>
-            <p:ph type="sldNum" sz="quarter" idx="7"/>
-          </p:nvPr>
-        </p:nvSpPr>
-        <p:spPr/>
-        <p:txBody>
-          <a:bodyPr/>
-          <a:p>
-            <a:fld id="{B6F15528-21DE-4FAA-801E-634DDDAF4B2B}" type="slidenum">
-              <a:rPr/>
-            </a:fld>
-            <a:endParaRPr/>
-          </a:p>
-        </p:txBody>
-      </p:sp>
-    </p:spTree>
-  </p:cSld>
-  <p:clrMapOvr>
-    <a:masterClrMapping/>
-  </p:clrMapOvr>
-</p:sld>
-</file>
-
-<file path=ppt/slides/slide33.xml><?xml version="1.0" encoding="utf-8"?>
-<p:sld xmlns:a="http://schemas.openxmlformats.org/drawingml/2006/main" xmlns:r="http://schemas.openxmlformats.org/officeDocument/2006/relationships" xmlns:p="http://schemas.openxmlformats.org/presentationml/2006/main" showMasterSp="0">
-  <p:cSld>
-    <p:spTree>
-      <p:nvGrpSpPr>
-        <p:cNvPr id="1" name=""/>
-        <p:cNvGrpSpPr/>
-        <p:nvPr/>
-      </p:nvGrpSpPr>
-      <p:grpSpPr>
-        <a:xfrm>
-          <a:off x="0" y="0"/>
-          <a:ext cx="0" cy="0"/>
-          <a:chOff x="0" y="0"/>
-          <a:chExt cx="0" cy="0"/>
-        </a:xfrm>
-      </p:grpSpPr>
-      <p:pic>
-        <p:nvPicPr>
-          <p:cNvPr id="2" name="object 2"/>
-          <p:cNvPicPr/>
-          <p:nvPr/>
-        </p:nvPicPr>
-        <p:blipFill>
-          <a:blip r:embed="rId1" cstate="print"/>
-          <a:stretch>
-            <a:fillRect/>
-          </a:stretch>
-        </p:blipFill>
-        <p:spPr>
-          <a:xfrm>
-            <a:off x="941493" y="4563532"/>
-            <a:ext cx="14373017" cy="50799"/>
-          </a:xfrm>
-          <a:prstGeom prst="rect">
-            <a:avLst/>
-          </a:prstGeom>
-        </p:spPr>
-      </p:pic>
-      <p:sp>
-        <p:nvSpPr>
-          <p:cNvPr id="3" name="object 3"/>
-          <p:cNvSpPr txBox="1">
-            <a:spLocks noGrp="1"/>
-          </p:cNvSpPr>
-          <p:nvPr>
-            <p:ph type="title"/>
-          </p:nvPr>
-        </p:nvSpPr>
-        <p:spPr>
-          <a:xfrm>
-            <a:off x="5604695" y="3668605"/>
-            <a:ext cx="9702800" cy="756920"/>
-          </a:xfrm>
-          <a:prstGeom prst="rect">
-            <a:avLst/>
-          </a:prstGeom>
-        </p:spPr>
-        <p:txBody>
-          <a:bodyPr vert="horz" wrap="square" lIns="0" tIns="12700" rIns="0" bIns="0" rtlCol="0">
-            <a:spAutoFit/>
-          </a:bodyPr>
-          <a:lstStyle/>
-          <a:p>
-            <a:pPr marL="12700">
-              <a:lnSpc>
-                <a:spcPct val="100000"/>
-              </a:lnSpc>
-              <a:spcBef>
-                <a:spcPts val="100"/>
-              </a:spcBef>
-            </a:pPr>
-            <a:r>
-              <a:rPr sz="4800" spc="260" dirty="0">
-                <a:solidFill>
-                  <a:srgbClr val="202020"/>
-                </a:solidFill>
-                <a:latin typeface="Verdana" panose="020B0604030504040204"/>
-                <a:cs typeface="Verdana" panose="020B0604030504040204"/>
-              </a:rPr>
-              <a:t>Add</a:t>
-            </a:r>
-            <a:r>
-              <a:rPr sz="4800" spc="-265" dirty="0">
-                <a:solidFill>
-                  <a:srgbClr val="202020"/>
-                </a:solidFill>
-                <a:latin typeface="Verdana" panose="020B0604030504040204"/>
-                <a:cs typeface="Verdana" panose="020B0604030504040204"/>
-              </a:rPr>
-              <a:t> </a:t>
-            </a:r>
-            <a:r>
-              <a:rPr sz="4800" spc="15" dirty="0">
-                <a:solidFill>
-                  <a:srgbClr val="202020"/>
-                </a:solidFill>
-                <a:latin typeface="Verdana" panose="020B0604030504040204"/>
-                <a:cs typeface="Verdana" panose="020B0604030504040204"/>
-              </a:rPr>
-              <a:t>Section</a:t>
-            </a:r>
-            <a:r>
-              <a:rPr sz="4800" spc="-260" dirty="0">
-                <a:solidFill>
-                  <a:srgbClr val="202020"/>
-                </a:solidFill>
-                <a:latin typeface="Verdana" panose="020B0604030504040204"/>
-                <a:cs typeface="Verdana" panose="020B0604030504040204"/>
-              </a:rPr>
-              <a:t> </a:t>
-            </a:r>
-            <a:r>
-              <a:rPr sz="4800" spc="-5" dirty="0">
-                <a:solidFill>
-                  <a:srgbClr val="202020"/>
-                </a:solidFill>
-                <a:latin typeface="Verdana" panose="020B0604030504040204"/>
-                <a:cs typeface="Verdana" panose="020B0604030504040204"/>
-              </a:rPr>
-              <a:t>Header</a:t>
-            </a:r>
-            <a:r>
-              <a:rPr sz="4800" spc="-260" dirty="0">
-                <a:solidFill>
-                  <a:srgbClr val="202020"/>
-                </a:solidFill>
-                <a:latin typeface="Verdana" panose="020B0604030504040204"/>
-                <a:cs typeface="Verdana" panose="020B0604030504040204"/>
-              </a:rPr>
-              <a:t> </a:t>
-            </a:r>
-            <a:r>
-              <a:rPr sz="4800" spc="-70" dirty="0">
-                <a:solidFill>
-                  <a:srgbClr val="202020"/>
-                </a:solidFill>
-                <a:latin typeface="Verdana" panose="020B0604030504040204"/>
-                <a:cs typeface="Verdana" panose="020B0604030504040204"/>
-              </a:rPr>
-              <a:t>in</a:t>
-            </a:r>
-            <a:r>
-              <a:rPr sz="4800" spc="-260" dirty="0">
-                <a:solidFill>
-                  <a:srgbClr val="202020"/>
-                </a:solidFill>
-                <a:latin typeface="Verdana" panose="020B0604030504040204"/>
-                <a:cs typeface="Verdana" panose="020B0604030504040204"/>
-              </a:rPr>
-              <a:t> </a:t>
-            </a:r>
-            <a:r>
-              <a:rPr sz="4800" spc="-10" dirty="0">
-                <a:solidFill>
-                  <a:srgbClr val="202020"/>
-                </a:solidFill>
-                <a:latin typeface="Verdana" panose="020B0604030504040204"/>
-                <a:cs typeface="Verdana" panose="020B0604030504040204"/>
-              </a:rPr>
-              <a:t>Titlecase</a:t>
-            </a:r>
-            <a:endParaRPr sz="4800">
-              <a:latin typeface="Verdana" panose="020B0604030504040204"/>
-              <a:cs typeface="Verdana" panose="020B0604030504040204"/>
-            </a:endParaRPr>
-          </a:p>
-        </p:txBody>
-      </p:sp>
-      <p:sp>
-        <p:nvSpPr>
-          <p:cNvPr id="4" name="Slide Number Placeholder 3"/>
           <p:cNvSpPr>
             <a:spLocks noGrp="1"/>
           </p:cNvSpPr>
@@ -20841,7 +20642,7 @@
         </p:nvSpPr>
         <p:spPr>
           <a:xfrm>
-            <a:off x="1390642" y="2912532"/>
+            <a:off x="5308592" y="3200187"/>
             <a:ext cx="6585584" cy="3714750"/>
           </a:xfrm>
           <a:prstGeom prst="rect">
@@ -20857,7 +20658,7 @@
           </a:bodyPr>
           <a:lstStyle/>
           <a:p>
-            <a:pPr>
+            <a:pPr algn="ctr">
               <a:lnSpc>
                 <a:spcPct val="100000"/>
               </a:lnSpc>
@@ -20868,7 +20669,7 @@
             </a:endParaRPr>
           </a:p>
           <a:p>
-            <a:pPr>
+            <a:pPr algn="ctr">
               <a:lnSpc>
                 <a:spcPct val="100000"/>
               </a:lnSpc>
@@ -20925,106 +20726,6 @@
                 <a:cs typeface="Verdana" panose="020B0604030504040204"/>
               </a:rPr>
               <a:t>dev.mysql.com/downloads/mysql</a:t>
-            </a:r>
-            <a:endParaRPr sz="2700">
-              <a:latin typeface="Verdana" panose="020B0604030504040204"/>
-              <a:cs typeface="Verdana" panose="020B0604030504040204"/>
-            </a:endParaRPr>
-          </a:p>
-        </p:txBody>
-      </p:sp>
-      <p:sp>
-        <p:nvSpPr>
-          <p:cNvPr id="4" name="object 4"/>
-          <p:cNvSpPr txBox="1"/>
-          <p:nvPr/>
-        </p:nvSpPr>
-        <p:spPr>
-          <a:xfrm>
-            <a:off x="8263406" y="2912532"/>
-            <a:ext cx="6585584" cy="3714750"/>
-          </a:xfrm>
-          <a:prstGeom prst="rect">
-            <a:avLst/>
-          </a:prstGeom>
-          <a:solidFill>
-            <a:srgbClr val="DDDDDD"/>
-          </a:solidFill>
-        </p:spPr>
-        <p:txBody>
-          <a:bodyPr vert="horz" wrap="square" lIns="0" tIns="0" rIns="0" bIns="0" rtlCol="0">
-            <a:spAutoFit/>
-          </a:bodyPr>
-          <a:lstStyle/>
-          <a:p>
-            <a:pPr>
-              <a:lnSpc>
-                <a:spcPct val="100000"/>
-              </a:lnSpc>
-            </a:pPr>
-            <a:endParaRPr sz="4100">
-              <a:latin typeface="Times New Roman" panose="02020603050405020304"/>
-              <a:cs typeface="Times New Roman" panose="02020603050405020304"/>
-            </a:endParaRPr>
-          </a:p>
-          <a:p>
-            <a:pPr>
-              <a:lnSpc>
-                <a:spcPct val="100000"/>
-              </a:lnSpc>
-              <a:spcBef>
-                <a:spcPts val="20"/>
-              </a:spcBef>
-            </a:pPr>
-            <a:endParaRPr sz="4200">
-              <a:latin typeface="Times New Roman" panose="02020603050405020304"/>
-              <a:cs typeface="Times New Roman" panose="02020603050405020304"/>
-            </a:endParaRPr>
-          </a:p>
-          <a:p>
-            <a:pPr algn="ctr">
-              <a:lnSpc>
-                <a:spcPct val="100000"/>
-              </a:lnSpc>
-            </a:pPr>
-            <a:r>
-              <a:rPr sz="3200" spc="20" dirty="0">
-                <a:solidFill>
-                  <a:srgbClr val="0C9DBF"/>
-                </a:solidFill>
-                <a:latin typeface="Verdana" panose="020B0604030504040204"/>
-                <a:cs typeface="Verdana" panose="020B0604030504040204"/>
-              </a:rPr>
-              <a:t>MariaDB</a:t>
-            </a:r>
-            <a:endParaRPr sz="3200">
-              <a:latin typeface="Verdana" panose="020B0604030504040204"/>
-              <a:cs typeface="Verdana" panose="020B0604030504040204"/>
-            </a:endParaRPr>
-          </a:p>
-          <a:p>
-            <a:pPr marL="11430" algn="ctr">
-              <a:lnSpc>
-                <a:spcPct val="100000"/>
-              </a:lnSpc>
-              <a:spcBef>
-                <a:spcPts val="2460"/>
-              </a:spcBef>
-            </a:pPr>
-            <a:r>
-              <a:rPr sz="2700" u="sng" spc="5" dirty="0">
-                <a:solidFill>
-                  <a:srgbClr val="0C9DBF"/>
-                </a:solidFill>
-                <a:uFill>
-                  <a:solidFill>
-                    <a:srgbClr val="0C9DBF"/>
-                  </a:solidFill>
-                </a:uFill>
-                <a:latin typeface="Verdana" panose="020B0604030504040204"/>
-                <a:cs typeface="Verdana" panose="020B0604030504040204"/>
-              </a:rPr>
-              <a:t>downloads.mariadb.org</a:t>
             </a:r>
             <a:endParaRPr sz="2700">
               <a:latin typeface="Verdana" panose="020B0604030504040204"/>

</xml_diff>